<commit_message>
updated section 4 and images
</commit_message>
<xml_diff>
--- a/Draft_Sketch.pptx
+++ b/Draft_Sketch.pptx
@@ -105,6 +105,11 @@
       </a:defRPr>
     </a:lvl9pPr>
   </p:defaultTextStyle>
+  <p:extLst>
+    <p:ext uri="{EFAFB233-063F-42B5-8137-9DF3F51BA10A}">
+      <p15:sldGuideLst xmlns:p15="http://schemas.microsoft.com/office/powerpoint/2012/main"/>
+    </p:ext>
+  </p:extLst>
 </p:presentation>
 </file>
 
@@ -358,11 +363,11 @@
         </c:dLbls>
         <c:gapWidth val="219"/>
         <c:overlap val="-27"/>
-        <c:axId val="-2015292064"/>
-        <c:axId val="-2127936688"/>
+        <c:axId val="-2143145200"/>
+        <c:axId val="-2081535520"/>
       </c:barChart>
       <c:catAx>
-        <c:axId val="-2015292064"/>
+        <c:axId val="-2143145200"/>
         <c:scaling>
           <c:orientation val="minMax"/>
         </c:scaling>
@@ -405,7 +410,7 @@
             <a:endParaRPr lang="en-US"/>
           </a:p>
         </c:txPr>
-        <c:crossAx val="-2127936688"/>
+        <c:crossAx val="-2081535520"/>
         <c:crosses val="autoZero"/>
         <c:auto val="1"/>
         <c:lblAlgn val="ctr"/>
@@ -413,7 +418,7 @@
         <c:noMultiLvlLbl val="0"/>
       </c:catAx>
       <c:valAx>
-        <c:axId val="-2127936688"/>
+        <c:axId val="-2081535520"/>
         <c:scaling>
           <c:orientation val="minMax"/>
         </c:scaling>
@@ -521,7 +526,7 @@
             <a:endParaRPr lang="en-US"/>
           </a:p>
         </c:txPr>
-        <c:crossAx val="-2015292064"/>
+        <c:crossAx val="-2143145200"/>
         <c:crosses val="autoZero"/>
         <c:crossBetween val="between"/>
       </c:valAx>
@@ -788,11 +793,11 @@
         </c:dLbls>
         <c:gapWidth val="219"/>
         <c:overlap val="-27"/>
-        <c:axId val="-1991486272"/>
-        <c:axId val="-1990541152"/>
+        <c:axId val="-2143237648"/>
+        <c:axId val="-2143243808"/>
       </c:barChart>
       <c:catAx>
-        <c:axId val="-1991486272"/>
+        <c:axId val="-2143237648"/>
         <c:scaling>
           <c:orientation val="minMax"/>
         </c:scaling>
@@ -835,7 +840,7 @@
             <a:endParaRPr lang="en-US"/>
           </a:p>
         </c:txPr>
-        <c:crossAx val="-1990541152"/>
+        <c:crossAx val="-2143243808"/>
         <c:crosses val="autoZero"/>
         <c:auto val="1"/>
         <c:lblAlgn val="ctr"/>
@@ -843,7 +848,7 @@
         <c:noMultiLvlLbl val="0"/>
       </c:catAx>
       <c:valAx>
-        <c:axId val="-1990541152"/>
+        <c:axId val="-2143243808"/>
         <c:scaling>
           <c:orientation val="minMax"/>
         </c:scaling>
@@ -951,7 +956,7 @@
             <a:endParaRPr lang="en-US"/>
           </a:p>
         </c:txPr>
-        <c:crossAx val="-1991486272"/>
+        <c:crossAx val="-2143237648"/>
         <c:crosses val="autoZero"/>
         <c:crossBetween val="between"/>
       </c:valAx>
@@ -1218,11 +1223,11 @@
         </c:dLbls>
         <c:gapWidth val="150"/>
         <c:overlap val="100"/>
-        <c:axId val="-2021488976"/>
-        <c:axId val="-2038401328"/>
+        <c:axId val="-2045732432"/>
+        <c:axId val="-2081461760"/>
       </c:barChart>
       <c:catAx>
-        <c:axId val="-2021488976"/>
+        <c:axId val="-2045732432"/>
         <c:scaling>
           <c:orientation val="minMax"/>
         </c:scaling>
@@ -1265,7 +1270,7 @@
             <a:endParaRPr lang="en-US"/>
           </a:p>
         </c:txPr>
-        <c:crossAx val="-2038401328"/>
+        <c:crossAx val="-2081461760"/>
         <c:crosses val="autoZero"/>
         <c:auto val="1"/>
         <c:lblAlgn val="ctr"/>
@@ -1273,7 +1278,7 @@
         <c:noMultiLvlLbl val="0"/>
       </c:catAx>
       <c:valAx>
-        <c:axId val="-2038401328"/>
+        <c:axId val="-2081461760"/>
         <c:scaling>
           <c:orientation val="minMax"/>
         </c:scaling>
@@ -1381,7 +1386,7 @@
             <a:endParaRPr lang="en-US"/>
           </a:p>
         </c:txPr>
-        <c:crossAx val="-2021488976"/>
+        <c:crossAx val="-2045732432"/>
         <c:crosses val="autoZero"/>
         <c:crossBetween val="between"/>
       </c:valAx>
@@ -1749,11 +1754,11 @@
           <c:showBubbleSize val="0"/>
         </c:dLbls>
         <c:smooth val="0"/>
-        <c:axId val="-1992145360"/>
-        <c:axId val="-1990536752"/>
+        <c:axId val="-2081568880"/>
+        <c:axId val="-2081577984"/>
       </c:lineChart>
       <c:catAx>
-        <c:axId val="-1992145360"/>
+        <c:axId val="-2081568880"/>
         <c:scaling>
           <c:orientation val="minMax"/>
         </c:scaling>
@@ -1796,7 +1801,7 @@
             <a:endParaRPr lang="en-US"/>
           </a:p>
         </c:txPr>
-        <c:crossAx val="-1990536752"/>
+        <c:crossAx val="-2081577984"/>
         <c:crosses val="autoZero"/>
         <c:auto val="1"/>
         <c:lblAlgn val="ctr"/>
@@ -1804,7 +1809,7 @@
         <c:noMultiLvlLbl val="0"/>
       </c:catAx>
       <c:valAx>
-        <c:axId val="-1990536752"/>
+        <c:axId val="-2081577984"/>
         <c:scaling>
           <c:orientation val="minMax"/>
         </c:scaling>
@@ -1886,7 +1891,7 @@
             <a:endParaRPr lang="en-US"/>
           </a:p>
         </c:txPr>
-        <c:crossAx val="-1992145360"/>
+        <c:crossAx val="-2081568880"/>
         <c:crosses val="autoZero"/>
         <c:crossBetween val="between"/>
       </c:valAx>
@@ -4263,7 +4268,7 @@
           <a:p>
             <a:fld id="{8142FA59-741D-264D-873D-790DAE389E9B}" type="datetimeFigureOut">
               <a:rPr lang="en-US" smtClean="0"/>
-              <a:t>1/7/19</a:t>
+              <a:t>1/11/19</a:t>
             </a:fld>
             <a:endParaRPr lang="en-US"/>
           </a:p>
@@ -4433,7 +4438,7 @@
           <a:p>
             <a:fld id="{8142FA59-741D-264D-873D-790DAE389E9B}" type="datetimeFigureOut">
               <a:rPr lang="en-US" smtClean="0"/>
-              <a:t>1/7/19</a:t>
+              <a:t>1/11/19</a:t>
             </a:fld>
             <a:endParaRPr lang="en-US"/>
           </a:p>
@@ -4613,7 +4618,7 @@
           <a:p>
             <a:fld id="{8142FA59-741D-264D-873D-790DAE389E9B}" type="datetimeFigureOut">
               <a:rPr lang="en-US" smtClean="0"/>
-              <a:t>1/7/19</a:t>
+              <a:t>1/11/19</a:t>
             </a:fld>
             <a:endParaRPr lang="en-US"/>
           </a:p>
@@ -4783,7 +4788,7 @@
           <a:p>
             <a:fld id="{8142FA59-741D-264D-873D-790DAE389E9B}" type="datetimeFigureOut">
               <a:rPr lang="en-US" smtClean="0"/>
-              <a:t>1/7/19</a:t>
+              <a:t>1/11/19</a:t>
             </a:fld>
             <a:endParaRPr lang="en-US"/>
           </a:p>
@@ -5029,7 +5034,7 @@
           <a:p>
             <a:fld id="{8142FA59-741D-264D-873D-790DAE389E9B}" type="datetimeFigureOut">
               <a:rPr lang="en-US" smtClean="0"/>
-              <a:t>1/7/19</a:t>
+              <a:t>1/11/19</a:t>
             </a:fld>
             <a:endParaRPr lang="en-US"/>
           </a:p>
@@ -5261,7 +5266,7 @@
           <a:p>
             <a:fld id="{8142FA59-741D-264D-873D-790DAE389E9B}" type="datetimeFigureOut">
               <a:rPr lang="en-US" smtClean="0"/>
-              <a:t>1/7/19</a:t>
+              <a:t>1/11/19</a:t>
             </a:fld>
             <a:endParaRPr lang="en-US"/>
           </a:p>
@@ -5628,7 +5633,7 @@
           <a:p>
             <a:fld id="{8142FA59-741D-264D-873D-790DAE389E9B}" type="datetimeFigureOut">
               <a:rPr lang="en-US" smtClean="0"/>
-              <a:t>1/7/19</a:t>
+              <a:t>1/11/19</a:t>
             </a:fld>
             <a:endParaRPr lang="en-US"/>
           </a:p>
@@ -5746,7 +5751,7 @@
           <a:p>
             <a:fld id="{8142FA59-741D-264D-873D-790DAE389E9B}" type="datetimeFigureOut">
               <a:rPr lang="en-US" smtClean="0"/>
-              <a:t>1/7/19</a:t>
+              <a:t>1/11/19</a:t>
             </a:fld>
             <a:endParaRPr lang="en-US"/>
           </a:p>
@@ -5841,7 +5846,7 @@
           <a:p>
             <a:fld id="{8142FA59-741D-264D-873D-790DAE389E9B}" type="datetimeFigureOut">
               <a:rPr lang="en-US" smtClean="0"/>
-              <a:t>1/7/19</a:t>
+              <a:t>1/11/19</a:t>
             </a:fld>
             <a:endParaRPr lang="en-US"/>
           </a:p>
@@ -6118,7 +6123,7 @@
           <a:p>
             <a:fld id="{8142FA59-741D-264D-873D-790DAE389E9B}" type="datetimeFigureOut">
               <a:rPr lang="en-US" smtClean="0"/>
-              <a:t>1/7/19</a:t>
+              <a:t>1/11/19</a:t>
             </a:fld>
             <a:endParaRPr lang="en-US"/>
           </a:p>
@@ -6371,7 +6376,7 @@
           <a:p>
             <a:fld id="{8142FA59-741D-264D-873D-790DAE389E9B}" type="datetimeFigureOut">
               <a:rPr lang="en-US" smtClean="0"/>
-              <a:t>1/7/19</a:t>
+              <a:t>1/11/19</a:t>
             </a:fld>
             <a:endParaRPr lang="en-US"/>
           </a:p>
@@ -6584,7 +6589,7 @@
           <a:p>
             <a:fld id="{8142FA59-741D-264D-873D-790DAE389E9B}" type="datetimeFigureOut">
               <a:rPr lang="en-US" smtClean="0"/>
-              <a:t>1/7/19</a:t>
+              <a:t>1/11/19</a:t>
             </a:fld>
             <a:endParaRPr lang="en-US"/>
           </a:p>
@@ -7160,133 +7165,6 @@
       </p:sp>
       <p:pic>
         <p:nvPicPr>
-          <p:cNvPr id="1028" name="Picture 4" descr="mage result for dropdown noun project"/>
-          <p:cNvPicPr>
-            <a:picLocks noChangeAspect="1" noChangeArrowheads="1"/>
-          </p:cNvPicPr>
-          <p:nvPr/>
-        </p:nvPicPr>
-        <p:blipFill>
-          <a:blip r:embed="rId2">
-            <a:extLst>
-              <a:ext uri="{28A0092B-C50C-407E-A947-70E740481C1C}">
-                <a14:useLocalDpi xmlns:a14="http://schemas.microsoft.com/office/drawing/2010/main" val="0"/>
-              </a:ext>
-            </a:extLst>
-          </a:blip>
-          <a:srcRect/>
-          <a:stretch>
-            <a:fillRect/>
-          </a:stretch>
-        </p:blipFill>
-        <p:spPr bwMode="auto">
-          <a:xfrm>
-            <a:off x="261257" y="4487246"/>
-            <a:ext cx="1163828" cy="1163828"/>
-          </a:xfrm>
-          <a:prstGeom prst="rect">
-            <a:avLst/>
-          </a:prstGeom>
-          <a:noFill/>
-          <a:extLst>
-            <a:ext uri="{909E8E84-426E-40DD-AFC4-6F175D3DCCD1}">
-              <a14:hiddenFill xmlns:a14="http://schemas.microsoft.com/office/drawing/2010/main">
-                <a:solidFill>
-                  <a:srgbClr val="FFFFFF"/>
-                </a:solidFill>
-              </a14:hiddenFill>
-            </a:ext>
-          </a:extLst>
-        </p:spPr>
-      </p:pic>
-      <p:sp>
-        <p:nvSpPr>
-          <p:cNvPr id="25" name="Rectangle 24"/>
-          <p:cNvSpPr/>
-          <p:nvPr/>
-        </p:nvSpPr>
-        <p:spPr>
-          <a:xfrm>
-            <a:off x="156942" y="3800130"/>
-            <a:ext cx="1311578" cy="830997"/>
-          </a:xfrm>
-          <a:prstGeom prst="rect">
-            <a:avLst/>
-          </a:prstGeom>
-        </p:spPr>
-        <p:txBody>
-          <a:bodyPr wrap="none">
-            <a:spAutoFit/>
-          </a:bodyPr>
-          <a:lstStyle/>
-          <a:p>
-            <a:pPr algn="ctr"/>
-            <a:r>
-              <a:rPr lang="en-US" sz="1600" dirty="0" smtClean="0">
-                <a:solidFill>
-                  <a:schemeClr val="bg1"/>
-                </a:solidFill>
-                <a:latin typeface="Helvetica" charset="0"/>
-                <a:ea typeface="Helvetica" charset="0"/>
-                <a:cs typeface="Helvetica" charset="0"/>
-              </a:rPr>
-              <a:t>Personal </a:t>
-            </a:r>
-            <a:br>
-              <a:rPr lang="en-US" sz="1600" dirty="0" smtClean="0">
-                <a:solidFill>
-                  <a:schemeClr val="bg1"/>
-                </a:solidFill>
-                <a:latin typeface="Helvetica" charset="0"/>
-                <a:ea typeface="Helvetica" charset="0"/>
-                <a:cs typeface="Helvetica" charset="0"/>
-              </a:rPr>
-            </a:br>
-            <a:r>
-              <a:rPr lang="en-US" sz="1600" dirty="0" smtClean="0">
-                <a:solidFill>
-                  <a:schemeClr val="bg1"/>
-                </a:solidFill>
-                <a:latin typeface="Helvetica" charset="0"/>
-                <a:ea typeface="Helvetica" charset="0"/>
-                <a:cs typeface="Helvetica" charset="0"/>
-              </a:rPr>
-              <a:t>vs </a:t>
-            </a:r>
-            <a:br>
-              <a:rPr lang="en-US" sz="1600" dirty="0" smtClean="0">
-                <a:solidFill>
-                  <a:schemeClr val="bg1"/>
-                </a:solidFill>
-                <a:latin typeface="Helvetica" charset="0"/>
-                <a:ea typeface="Helvetica" charset="0"/>
-                <a:cs typeface="Helvetica" charset="0"/>
-              </a:rPr>
-            </a:br>
-            <a:r>
-              <a:rPr lang="en-US" sz="1600" dirty="0" smtClean="0">
-                <a:solidFill>
-                  <a:schemeClr val="bg1"/>
-                </a:solidFill>
-                <a:latin typeface="Helvetica" charset="0"/>
-                <a:ea typeface="Helvetica" charset="0"/>
-                <a:cs typeface="Helvetica" charset="0"/>
-              </a:rPr>
-              <a:t>Professional</a:t>
-            </a:r>
-            <a:endParaRPr lang="en-US" sz="1600" dirty="0" smtClean="0">
-              <a:solidFill>
-                <a:schemeClr val="bg1"/>
-              </a:solidFill>
-              <a:latin typeface="Helvetica" charset="0"/>
-              <a:ea typeface="Helvetica" charset="0"/>
-              <a:cs typeface="Helvetica" charset="0"/>
-            </a:endParaRPr>
-          </a:p>
-        </p:txBody>
-      </p:sp>
-      <p:pic>
-        <p:nvPicPr>
           <p:cNvPr id="28" name="Picture 4" descr="mage result for dropdown noun project"/>
           <p:cNvPicPr>
             <a:picLocks noChangeAspect="1" noChangeArrowheads="1"/>
@@ -7308,7 +7186,7 @@
         </p:blipFill>
         <p:spPr bwMode="auto">
           <a:xfrm>
-            <a:off x="217367" y="2269941"/>
+            <a:off x="217367" y="1693166"/>
             <a:ext cx="1163828" cy="1163828"/>
           </a:xfrm>
           <a:prstGeom prst="rect">
@@ -7334,7 +7212,7 @@
         </p:nvSpPr>
         <p:spPr>
           <a:xfrm>
-            <a:off x="347875" y="1956673"/>
+            <a:off x="347875" y="1379898"/>
             <a:ext cx="902811" cy="338554"/>
           </a:xfrm>
           <a:prstGeom prst="rect">
@@ -7577,6 +7455,125 @@
               <a:t>100</a:t>
             </a:r>
             <a:endParaRPr lang="en-US"/>
+          </a:p>
+        </p:txBody>
+      </p:sp>
+      <p:pic>
+        <p:nvPicPr>
+          <p:cNvPr id="15" name="Picture 4" descr="mage result for dropdown noun project"/>
+          <p:cNvPicPr>
+            <a:picLocks noChangeAspect="1" noChangeArrowheads="1"/>
+          </p:cNvPicPr>
+          <p:nvPr/>
+        </p:nvPicPr>
+        <p:blipFill>
+          <a:blip r:embed="rId2">
+            <a:extLst>
+              <a:ext uri="{28A0092B-C50C-407E-A947-70E740481C1C}">
+                <a14:useLocalDpi xmlns:a14="http://schemas.microsoft.com/office/drawing/2010/main" val="0"/>
+              </a:ext>
+            </a:extLst>
+          </a:blip>
+          <a:srcRect/>
+          <a:stretch>
+            <a:fillRect/>
+          </a:stretch>
+        </p:blipFill>
+        <p:spPr bwMode="auto">
+          <a:xfrm>
+            <a:off x="261257" y="3797929"/>
+            <a:ext cx="1163828" cy="1163828"/>
+          </a:xfrm>
+          <a:prstGeom prst="rect">
+            <a:avLst/>
+          </a:prstGeom>
+          <a:noFill/>
+          <a:extLst>
+            <a:ext uri="{909E8E84-426E-40DD-AFC4-6F175D3DCCD1}">
+              <a14:hiddenFill xmlns:a14="http://schemas.microsoft.com/office/drawing/2010/main">
+                <a:solidFill>
+                  <a:srgbClr val="FFFFFF"/>
+                </a:solidFill>
+              </a14:hiddenFill>
+            </a:ext>
+          </a:extLst>
+        </p:spPr>
+      </p:pic>
+      <p:sp>
+        <p:nvSpPr>
+          <p:cNvPr id="16" name="Rectangle 15"/>
+          <p:cNvSpPr/>
+          <p:nvPr/>
+        </p:nvSpPr>
+        <p:spPr>
+          <a:xfrm>
+            <a:off x="156942" y="3110813"/>
+            <a:ext cx="1311578" cy="830997"/>
+          </a:xfrm>
+          <a:prstGeom prst="rect">
+            <a:avLst/>
+          </a:prstGeom>
+        </p:spPr>
+        <p:txBody>
+          <a:bodyPr wrap="none">
+            <a:spAutoFit/>
+          </a:bodyPr>
+          <a:lstStyle/>
+          <a:p>
+            <a:pPr algn="ctr"/>
+            <a:r>
+              <a:rPr lang="en-US" sz="1600" dirty="0" smtClean="0">
+                <a:solidFill>
+                  <a:schemeClr val="bg1"/>
+                </a:solidFill>
+                <a:latin typeface="Helvetica" charset="0"/>
+                <a:ea typeface="Helvetica" charset="0"/>
+                <a:cs typeface="Helvetica" charset="0"/>
+              </a:rPr>
+              <a:t>Personal </a:t>
+            </a:r>
+            <a:br>
+              <a:rPr lang="en-US" sz="1600" dirty="0" smtClean="0">
+                <a:solidFill>
+                  <a:schemeClr val="bg1"/>
+                </a:solidFill>
+                <a:latin typeface="Helvetica" charset="0"/>
+                <a:ea typeface="Helvetica" charset="0"/>
+                <a:cs typeface="Helvetica" charset="0"/>
+              </a:rPr>
+            </a:br>
+            <a:r>
+              <a:rPr lang="en-US" sz="1600" dirty="0" smtClean="0">
+                <a:solidFill>
+                  <a:schemeClr val="bg1"/>
+                </a:solidFill>
+                <a:latin typeface="Helvetica" charset="0"/>
+                <a:ea typeface="Helvetica" charset="0"/>
+                <a:cs typeface="Helvetica" charset="0"/>
+              </a:rPr>
+              <a:t>vs </a:t>
+            </a:r>
+            <a:br>
+              <a:rPr lang="en-US" sz="1600" dirty="0" smtClean="0">
+                <a:solidFill>
+                  <a:schemeClr val="bg1"/>
+                </a:solidFill>
+                <a:latin typeface="Helvetica" charset="0"/>
+                <a:ea typeface="Helvetica" charset="0"/>
+                <a:cs typeface="Helvetica" charset="0"/>
+              </a:rPr>
+            </a:br>
+            <a:r>
+              <a:rPr lang="en-US" sz="1600" dirty="0" smtClean="0">
+                <a:solidFill>
+                  <a:schemeClr val="bg1"/>
+                </a:solidFill>
+                <a:latin typeface="Helvetica" charset="0"/>
+                <a:ea typeface="Helvetica" charset="0"/>
+                <a:cs typeface="Helvetica" charset="0"/>
+              </a:rPr>
+              <a:t>Professional</a:t>
+            </a:r>
           </a:p>
         </p:txBody>
       </p:sp>
@@ -7890,9 +7887,47 @@
           </a:p>
         </p:txBody>
       </p:sp>
+      <p:sp>
+        <p:nvSpPr>
+          <p:cNvPr id="19" name="TextBox 18"/>
+          <p:cNvSpPr txBox="1"/>
+          <p:nvPr/>
+        </p:nvSpPr>
+        <p:spPr>
+          <a:xfrm>
+            <a:off x="3550207" y="207378"/>
+            <a:ext cx="5870068" cy="461665"/>
+          </a:xfrm>
+          <a:prstGeom prst="rect">
+            <a:avLst/>
+          </a:prstGeom>
+          <a:noFill/>
+        </p:spPr>
+        <p:txBody>
+          <a:bodyPr wrap="none" rtlCol="0">
+            <a:spAutoFit/>
+          </a:bodyPr>
+          <a:lstStyle/>
+          <a:p>
+            <a:r>
+              <a:rPr lang="en-US" sz="2400" dirty="0" smtClean="0">
+                <a:latin typeface="Helvetica" charset="0"/>
+                <a:ea typeface="Helvetica" charset="0"/>
+                <a:cs typeface="Helvetica" charset="0"/>
+              </a:rPr>
+              <a:t>Plots of Different Variables Given Filters   </a:t>
+            </a:r>
+            <a:endParaRPr lang="en-US" sz="2400" dirty="0">
+              <a:latin typeface="Helvetica" charset="0"/>
+              <a:ea typeface="Helvetica" charset="0"/>
+              <a:cs typeface="Helvetica" charset="0"/>
+            </a:endParaRPr>
+          </a:p>
+        </p:txBody>
+      </p:sp>
       <p:pic>
         <p:nvPicPr>
-          <p:cNvPr id="1028" name="Picture 4" descr="mage result for dropdown noun project"/>
+          <p:cNvPr id="18" name="Picture 4" descr="mage result for dropdown noun project"/>
           <p:cNvPicPr>
             <a:picLocks noChangeAspect="1" noChangeArrowheads="1"/>
           </p:cNvPicPr>
@@ -7913,48 +7948,7 @@
         </p:blipFill>
         <p:spPr bwMode="auto">
           <a:xfrm>
-            <a:off x="261257" y="4487246"/>
-            <a:ext cx="1163828" cy="1163828"/>
-          </a:xfrm>
-          <a:prstGeom prst="rect">
-            <a:avLst/>
-          </a:prstGeom>
-          <a:noFill/>
-          <a:extLst>
-            <a:ext uri="{909E8E84-426E-40DD-AFC4-6F175D3DCCD1}">
-              <a14:hiddenFill xmlns:a14="http://schemas.microsoft.com/office/drawing/2010/main">
-                <a:solidFill>
-                  <a:srgbClr val="FFFFFF"/>
-                </a:solidFill>
-              </a14:hiddenFill>
-            </a:ext>
-          </a:extLst>
-        </p:spPr>
-      </p:pic>
-      <p:pic>
-        <p:nvPicPr>
-          <p:cNvPr id="28" name="Picture 4" descr="mage result for dropdown noun project"/>
-          <p:cNvPicPr>
-            <a:picLocks noChangeAspect="1" noChangeArrowheads="1"/>
-          </p:cNvPicPr>
-          <p:nvPr/>
-        </p:nvPicPr>
-        <p:blipFill>
-          <a:blip r:embed="rId7">
-            <a:extLst>
-              <a:ext uri="{28A0092B-C50C-407E-A947-70E740481C1C}">
-                <a14:useLocalDpi xmlns:a14="http://schemas.microsoft.com/office/drawing/2010/main" val="0"/>
-              </a:ext>
-            </a:extLst>
-          </a:blip>
-          <a:srcRect/>
-          <a:stretch>
-            <a:fillRect/>
-          </a:stretch>
-        </p:blipFill>
-        <p:spPr bwMode="auto">
-          <a:xfrm>
-            <a:off x="217367" y="2269941"/>
+            <a:off x="261257" y="3797929"/>
             <a:ext cx="1163828" cy="1163828"/>
           </a:xfrm>
           <a:prstGeom prst="rect">
@@ -7974,13 +7968,13 @@
       </p:pic>
       <p:sp>
         <p:nvSpPr>
-          <p:cNvPr id="16" name="Rectangle 15"/>
+          <p:cNvPr id="24" name="Rectangle 23"/>
           <p:cNvSpPr/>
           <p:nvPr/>
         </p:nvSpPr>
         <p:spPr>
           <a:xfrm>
-            <a:off x="156942" y="3800130"/>
+            <a:off x="156942" y="3110813"/>
             <a:ext cx="1311578" cy="830997"/>
           </a:xfrm>
           <a:prstGeom prst="rect">
@@ -8047,26 +8041,59 @@
               </a:rPr>
               <a:t>Professional</a:t>
             </a:r>
-            <a:endParaRPr lang="en-US" sz="1600" dirty="0" smtClean="0">
-              <a:solidFill>
-                <a:schemeClr val="bg1"/>
-              </a:solidFill>
-              <a:latin typeface="Helvetica" charset="0"/>
-              <a:ea typeface="Helvetica" charset="0"/>
-              <a:cs typeface="Helvetica" charset="0"/>
-            </a:endParaRPr>
           </a:p>
         </p:txBody>
       </p:sp>
+      <p:pic>
+        <p:nvPicPr>
+          <p:cNvPr id="25" name="Picture 4" descr="mage result for dropdown noun project"/>
+          <p:cNvPicPr>
+            <a:picLocks noChangeAspect="1" noChangeArrowheads="1"/>
+          </p:cNvPicPr>
+          <p:nvPr/>
+        </p:nvPicPr>
+        <p:blipFill>
+          <a:blip r:embed="rId7">
+            <a:extLst>
+              <a:ext uri="{28A0092B-C50C-407E-A947-70E740481C1C}">
+                <a14:useLocalDpi xmlns:a14="http://schemas.microsoft.com/office/drawing/2010/main" val="0"/>
+              </a:ext>
+            </a:extLst>
+          </a:blip>
+          <a:srcRect/>
+          <a:stretch>
+            <a:fillRect/>
+          </a:stretch>
+        </p:blipFill>
+        <p:spPr bwMode="auto">
+          <a:xfrm>
+            <a:off x="217367" y="1693166"/>
+            <a:ext cx="1163828" cy="1163828"/>
+          </a:xfrm>
+          <a:prstGeom prst="rect">
+            <a:avLst/>
+          </a:prstGeom>
+          <a:noFill/>
+          <a:extLst>
+            <a:ext uri="{909E8E84-426E-40DD-AFC4-6F175D3DCCD1}">
+              <a14:hiddenFill xmlns:a14="http://schemas.microsoft.com/office/drawing/2010/main">
+                <a:solidFill>
+                  <a:srgbClr val="FFFFFF"/>
+                </a:solidFill>
+              </a14:hiddenFill>
+            </a:ext>
+          </a:extLst>
+        </p:spPr>
+      </p:pic>
       <p:sp>
         <p:nvSpPr>
-          <p:cNvPr id="17" name="TextBox 16"/>
+          <p:cNvPr id="26" name="TextBox 25"/>
           <p:cNvSpPr txBox="1"/>
           <p:nvPr/>
         </p:nvSpPr>
         <p:spPr>
           <a:xfrm>
-            <a:off x="347875" y="1956673"/>
+            <a:off x="347875" y="1379898"/>
             <a:ext cx="902811" cy="338554"/>
           </a:xfrm>
           <a:prstGeom prst="rect">
@@ -8102,16 +8129,45 @@
           </a:p>
         </p:txBody>
       </p:sp>
+      <p:pic>
+        <p:nvPicPr>
+          <p:cNvPr id="2" name="Picture 1"/>
+          <p:cNvPicPr>
+            <a:picLocks noChangeAspect="1"/>
+          </p:cNvPicPr>
+          <p:nvPr/>
+        </p:nvPicPr>
+        <p:blipFill rotWithShape="1">
+          <a:blip r:embed="rId8">
+            <a:extLst>
+              <a:ext uri="{28A0092B-C50C-407E-A947-70E740481C1C}">
+                <a14:useLocalDpi xmlns:a14="http://schemas.microsoft.com/office/drawing/2010/main" val="0"/>
+              </a:ext>
+            </a:extLst>
+          </a:blip>
+          <a:srcRect b="17744"/>
+          <a:stretch/>
+        </p:blipFill>
+        <p:spPr>
+          <a:xfrm>
+            <a:off x="217367" y="5590198"/>
+            <a:ext cx="1067602" cy="878171"/>
+          </a:xfrm>
+          <a:prstGeom prst="rect">
+            <a:avLst/>
+          </a:prstGeom>
+        </p:spPr>
+      </p:pic>
       <p:sp>
         <p:nvSpPr>
-          <p:cNvPr id="19" name="TextBox 18"/>
+          <p:cNvPr id="27" name="TextBox 26"/>
           <p:cNvSpPr txBox="1"/>
           <p:nvPr/>
         </p:nvSpPr>
         <p:spPr>
           <a:xfrm>
-            <a:off x="3550207" y="207378"/>
-            <a:ext cx="5870068" cy="461665"/>
+            <a:off x="390079" y="5218612"/>
+            <a:ext cx="869149" cy="338554"/>
           </a:xfrm>
           <a:prstGeom prst="rect">
             <a:avLst/>
@@ -8125,14 +8181,20 @@
           <a:lstStyle/>
           <a:p>
             <a:r>
-              <a:rPr lang="en-US" sz="2400" dirty="0" smtClean="0">
+              <a:rPr lang="en-US" sz="1600" smtClean="0">
+                <a:solidFill>
+                  <a:schemeClr val="bg1"/>
+                </a:solidFill>
                 <a:latin typeface="Helvetica" charset="0"/>
                 <a:ea typeface="Helvetica" charset="0"/>
                 <a:cs typeface="Helvetica" charset="0"/>
               </a:rPr>
-              <a:t>Plots of Different Variables Given Filters   </a:t>
+              <a:t>Gender</a:t>
             </a:r>
-            <a:endParaRPr lang="en-US" sz="2400" dirty="0">
+            <a:endParaRPr lang="en-US" dirty="0">
+              <a:solidFill>
+                <a:schemeClr val="bg1"/>
+              </a:solidFill>
               <a:latin typeface="Helvetica" charset="0"/>
               <a:ea typeface="Helvetica" charset="0"/>
               <a:cs typeface="Helvetica" charset="0"/>

</xml_diff>